<commit_message>
Fix placeholder for PPTX
</commit_message>
<xml_diff>
--- a/template.pptx
+++ b/template.pptx
@@ -8,7 +8,7 @@
     <p:notesMasterId r:id="rId6"/>
   </p:notesMasterIdLst>
   <p:sldIdLst>
-    <p:sldId id="361" r:id="rId5"/>
+    <p:sldId id="328" r:id="rId5"/>
   </p:sldIdLst>
   <p:sldSz cx="6858000" cy="9906000" type="A4"/>
   <p:notesSz cx="6794500" cy="9906000"/>
@@ -115,208 +115,6 @@
 </p:presentation>
 </file>
 
-<file path=ppt/revisionInfo.xml><?xml version="1.0" encoding="utf-8"?>
-<p1510:revInfo xmlns:a="http://schemas.openxmlformats.org/drawingml/2006/main" xmlns:r="http://schemas.openxmlformats.org/officeDocument/2006/relationships" xmlns:p1510="http://schemas.microsoft.com/office/powerpoint/2015/10/main">
-  <p1510:revLst>
-    <p1510:client id="{D8A4DCD1-0234-4A0B-85AD-7590B10512CE}" v="26" dt="2025-05-16T08:10:36.568"/>
-  </p1510:revLst>
-</p1510:revInfo>
-</file>
-
-<file path=ppt/changesInfos/changesInfo1.xml><?xml version="1.0" encoding="utf-8"?>
-<pc:chgInfo xmlns:a="http://schemas.openxmlformats.org/drawingml/2006/main" xmlns:r="http://schemas.openxmlformats.org/officeDocument/2006/relationships" xmlns:ac="http://schemas.microsoft.com/office/drawing/2013/main/command" xmlns:pc="http://schemas.microsoft.com/office/powerpoint/2013/main/command">
-  <pc:docChgLst>
-    <pc:chgData name="Zamira Mektibayeva" userId="38736087-3d41-4c80-b94d-b050248fcfe1" providerId="ADAL" clId="{D8A4DCD1-0234-4A0B-85AD-7590B10512CE}"/>
-    <pc:docChg chg="custSel addSld delSld modSld">
-      <pc:chgData name="Zamira Mektibayeva" userId="38736087-3d41-4c80-b94d-b050248fcfe1" providerId="ADAL" clId="{D8A4DCD1-0234-4A0B-85AD-7590B10512CE}" dt="2025-05-19T05:37:51.024" v="163" actId="47"/>
-      <pc:docMkLst>
-        <pc:docMk/>
-      </pc:docMkLst>
-      <pc:sldChg chg="delSp modSp mod">
-        <pc:chgData name="Zamira Mektibayeva" userId="38736087-3d41-4c80-b94d-b050248fcfe1" providerId="ADAL" clId="{D8A4DCD1-0234-4A0B-85AD-7590B10512CE}" dt="2025-05-16T06:45:34.283" v="57" actId="20577"/>
-        <pc:sldMkLst>
-          <pc:docMk/>
-          <pc:sldMk cId="2263169905" sldId="361"/>
-        </pc:sldMkLst>
-        <pc:spChg chg="mod">
-          <ac:chgData name="Zamira Mektibayeva" userId="38736087-3d41-4c80-b94d-b050248fcfe1" providerId="ADAL" clId="{D8A4DCD1-0234-4A0B-85AD-7590B10512CE}" dt="2025-05-16T06:45:34.283" v="57" actId="20577"/>
-          <ac:spMkLst>
-            <pc:docMk/>
-            <pc:sldMk cId="2263169905" sldId="361"/>
-            <ac:spMk id="4" creationId="{00000000-0000-0000-0000-000000000000}"/>
-          </ac:spMkLst>
-        </pc:spChg>
-      </pc:sldChg>
-      <pc:sldChg chg="delSp modSp del mod">
-        <pc:chgData name="Zamira Mektibayeva" userId="38736087-3d41-4c80-b94d-b050248fcfe1" providerId="ADAL" clId="{D8A4DCD1-0234-4A0B-85AD-7590B10512CE}" dt="2025-05-02T11:42:12.216" v="40" actId="47"/>
-        <pc:sldMkLst>
-          <pc:docMk/>
-          <pc:sldMk cId="582930104" sldId="362"/>
-        </pc:sldMkLst>
-      </pc:sldChg>
-      <pc:sldChg chg="modSp add del mod">
-        <pc:chgData name="Zamira Mektibayeva" userId="38736087-3d41-4c80-b94d-b050248fcfe1" providerId="ADAL" clId="{D8A4DCD1-0234-4A0B-85AD-7590B10512CE}" dt="2025-05-16T07:27:56.695" v="101" actId="2696"/>
-        <pc:sldMkLst>
-          <pc:docMk/>
-          <pc:sldMk cId="1136857674" sldId="362"/>
-        </pc:sldMkLst>
-      </pc:sldChg>
-      <pc:sldChg chg="del">
-        <pc:chgData name="Zamira Mektibayeva" userId="38736087-3d41-4c80-b94d-b050248fcfe1" providerId="ADAL" clId="{D8A4DCD1-0234-4A0B-85AD-7590B10512CE}" dt="2025-05-02T11:41:19.651" v="2" actId="47"/>
-        <pc:sldMkLst>
-          <pc:docMk/>
-          <pc:sldMk cId="2996043277" sldId="363"/>
-        </pc:sldMkLst>
-      </pc:sldChg>
-      <pc:sldChg chg="modSp add mod">
-        <pc:chgData name="Zamira Mektibayeva" userId="38736087-3d41-4c80-b94d-b050248fcfe1" providerId="ADAL" clId="{D8A4DCD1-0234-4A0B-85AD-7590B10512CE}" dt="2025-05-16T06:55:11.476" v="79"/>
-        <pc:sldMkLst>
-          <pc:docMk/>
-          <pc:sldMk cId="3726071092" sldId="363"/>
-        </pc:sldMkLst>
-        <pc:spChg chg="mod">
-          <ac:chgData name="Zamira Mektibayeva" userId="38736087-3d41-4c80-b94d-b050248fcfe1" providerId="ADAL" clId="{D8A4DCD1-0234-4A0B-85AD-7590B10512CE}" dt="2025-05-16T06:55:11.476" v="79"/>
-          <ac:spMkLst>
-            <pc:docMk/>
-            <pc:sldMk cId="3726071092" sldId="363"/>
-            <ac:spMk id="4" creationId="{40196906-33EE-ABEE-37AD-84CB32570D35}"/>
-          </ac:spMkLst>
-        </pc:spChg>
-      </pc:sldChg>
-      <pc:sldChg chg="modSp add mod">
-        <pc:chgData name="Zamira Mektibayeva" userId="38736087-3d41-4c80-b94d-b050248fcfe1" providerId="ADAL" clId="{D8A4DCD1-0234-4A0B-85AD-7590B10512CE}" dt="2025-05-16T06:57:55.904" v="88" actId="1076"/>
-        <pc:sldMkLst>
-          <pc:docMk/>
-          <pc:sldMk cId="3665837764" sldId="364"/>
-        </pc:sldMkLst>
-        <pc:spChg chg="mod">
-          <ac:chgData name="Zamira Mektibayeva" userId="38736087-3d41-4c80-b94d-b050248fcfe1" providerId="ADAL" clId="{D8A4DCD1-0234-4A0B-85AD-7590B10512CE}" dt="2025-05-16T06:57:55.904" v="88" actId="1076"/>
-          <ac:spMkLst>
-            <pc:docMk/>
-            <pc:sldMk cId="3665837764" sldId="364"/>
-            <ac:spMk id="4" creationId="{FFF51C4E-2A77-EDE0-AD23-EE46C90E0A48}"/>
-          </ac:spMkLst>
-        </pc:spChg>
-      </pc:sldChg>
-      <pc:sldChg chg="modSp add mod">
-        <pc:chgData name="Zamira Mektibayeva" userId="38736087-3d41-4c80-b94d-b050248fcfe1" providerId="ADAL" clId="{D8A4DCD1-0234-4A0B-85AD-7590B10512CE}" dt="2025-05-16T06:58:13.457" v="89" actId="1076"/>
-        <pc:sldMkLst>
-          <pc:docMk/>
-          <pc:sldMk cId="2315895598" sldId="365"/>
-        </pc:sldMkLst>
-        <pc:spChg chg="mod">
-          <ac:chgData name="Zamira Mektibayeva" userId="38736087-3d41-4c80-b94d-b050248fcfe1" providerId="ADAL" clId="{D8A4DCD1-0234-4A0B-85AD-7590B10512CE}" dt="2025-05-16T06:58:13.457" v="89" actId="1076"/>
-          <ac:spMkLst>
-            <pc:docMk/>
-            <pc:sldMk cId="2315895598" sldId="365"/>
-            <ac:spMk id="4" creationId="{727EB274-7140-0756-9097-E29242F428E0}"/>
-          </ac:spMkLst>
-        </pc:spChg>
-      </pc:sldChg>
-      <pc:sldChg chg="modSp add del mod">
-        <pc:chgData name="Zamira Mektibayeva" userId="38736087-3d41-4c80-b94d-b050248fcfe1" providerId="ADAL" clId="{D8A4DCD1-0234-4A0B-85AD-7590B10512CE}" dt="2025-05-19T05:37:51.024" v="163" actId="47"/>
-        <pc:sldMkLst>
-          <pc:docMk/>
-          <pc:sldMk cId="2235618819" sldId="366"/>
-        </pc:sldMkLst>
-      </pc:sldChg>
-      <pc:sldChg chg="modSp add del mod">
-        <pc:chgData name="Zamira Mektibayeva" userId="38736087-3d41-4c80-b94d-b050248fcfe1" providerId="ADAL" clId="{D8A4DCD1-0234-4A0B-85AD-7590B10512CE}" dt="2025-05-19T05:37:50.019" v="162" actId="47"/>
-        <pc:sldMkLst>
-          <pc:docMk/>
-          <pc:sldMk cId="2467095683" sldId="367"/>
-        </pc:sldMkLst>
-      </pc:sldChg>
-      <pc:sldChg chg="modSp add del mod">
-        <pc:chgData name="Zamira Mektibayeva" userId="38736087-3d41-4c80-b94d-b050248fcfe1" providerId="ADAL" clId="{D8A4DCD1-0234-4A0B-85AD-7590B10512CE}" dt="2025-05-19T05:37:49.645" v="161" actId="47"/>
-        <pc:sldMkLst>
-          <pc:docMk/>
-          <pc:sldMk cId="256927752" sldId="368"/>
-        </pc:sldMkLst>
-      </pc:sldChg>
-      <pc:sldChg chg="modSp add del mod">
-        <pc:chgData name="Zamira Mektibayeva" userId="38736087-3d41-4c80-b94d-b050248fcfe1" providerId="ADAL" clId="{D8A4DCD1-0234-4A0B-85AD-7590B10512CE}" dt="2025-05-19T05:37:49.263" v="160" actId="47"/>
-        <pc:sldMkLst>
-          <pc:docMk/>
-          <pc:sldMk cId="3385541067" sldId="369"/>
-        </pc:sldMkLst>
-      </pc:sldChg>
-      <pc:sldChg chg="add del">
-        <pc:chgData name="Zamira Mektibayeva" userId="38736087-3d41-4c80-b94d-b050248fcfe1" providerId="ADAL" clId="{D8A4DCD1-0234-4A0B-85AD-7590B10512CE}" dt="2025-05-19T05:37:49.022" v="159" actId="47"/>
-        <pc:sldMkLst>
-          <pc:docMk/>
-          <pc:sldMk cId="3333667269" sldId="370"/>
-        </pc:sldMkLst>
-      </pc:sldChg>
-      <pc:sldChg chg="modSp add del mod">
-        <pc:chgData name="Zamira Mektibayeva" userId="38736087-3d41-4c80-b94d-b050248fcfe1" providerId="ADAL" clId="{D8A4DCD1-0234-4A0B-85AD-7590B10512CE}" dt="2025-05-19T05:37:48.875" v="158" actId="47"/>
-        <pc:sldMkLst>
-          <pc:docMk/>
-          <pc:sldMk cId="2395498812" sldId="371"/>
-        </pc:sldMkLst>
-      </pc:sldChg>
-      <pc:sldChg chg="add del">
-        <pc:chgData name="Zamira Mektibayeva" userId="38736087-3d41-4c80-b94d-b050248fcfe1" providerId="ADAL" clId="{D8A4DCD1-0234-4A0B-85AD-7590B10512CE}" dt="2025-05-19T05:37:48.714" v="157" actId="47"/>
-        <pc:sldMkLst>
-          <pc:docMk/>
-          <pc:sldMk cId="2509356571" sldId="372"/>
-        </pc:sldMkLst>
-      </pc:sldChg>
-      <pc:sldChg chg="modSp add del mod">
-        <pc:chgData name="Zamira Mektibayeva" userId="38736087-3d41-4c80-b94d-b050248fcfe1" providerId="ADAL" clId="{D8A4DCD1-0234-4A0B-85AD-7590B10512CE}" dt="2025-05-19T05:37:48.596" v="156" actId="47"/>
-        <pc:sldMkLst>
-          <pc:docMk/>
-          <pc:sldMk cId="1047005723" sldId="373"/>
-        </pc:sldMkLst>
-      </pc:sldChg>
-      <pc:sldChg chg="modSp add del mod">
-        <pc:chgData name="Zamira Mektibayeva" userId="38736087-3d41-4c80-b94d-b050248fcfe1" providerId="ADAL" clId="{D8A4DCD1-0234-4A0B-85AD-7590B10512CE}" dt="2025-05-19T05:37:48.451" v="155" actId="47"/>
-        <pc:sldMkLst>
-          <pc:docMk/>
-          <pc:sldMk cId="748758302" sldId="374"/>
-        </pc:sldMkLst>
-      </pc:sldChg>
-      <pc:sldChg chg="modSp add del mod">
-        <pc:chgData name="Zamira Mektibayeva" userId="38736087-3d41-4c80-b94d-b050248fcfe1" providerId="ADAL" clId="{D8A4DCD1-0234-4A0B-85AD-7590B10512CE}" dt="2025-05-19T05:37:48.320" v="154" actId="47"/>
-        <pc:sldMkLst>
-          <pc:docMk/>
-          <pc:sldMk cId="1421726444" sldId="375"/>
-        </pc:sldMkLst>
-      </pc:sldChg>
-      <pc:sldChg chg="modSp add del mod">
-        <pc:chgData name="Zamira Mektibayeva" userId="38736087-3d41-4c80-b94d-b050248fcfe1" providerId="ADAL" clId="{D8A4DCD1-0234-4A0B-85AD-7590B10512CE}" dt="2025-05-19T05:37:48.161" v="153" actId="47"/>
-        <pc:sldMkLst>
-          <pc:docMk/>
-          <pc:sldMk cId="3199367300" sldId="376"/>
-        </pc:sldMkLst>
-      </pc:sldChg>
-      <pc:sldChg chg="modSp add mod">
-        <pc:chgData name="Zamira Mektibayeva" userId="38736087-3d41-4c80-b94d-b050248fcfe1" providerId="ADAL" clId="{D8A4DCD1-0234-4A0B-85AD-7590B10512CE}" dt="2025-05-16T07:28:22.912" v="102"/>
-        <pc:sldMkLst>
-          <pc:docMk/>
-          <pc:sldMk cId="3499386905" sldId="377"/>
-        </pc:sldMkLst>
-        <pc:spChg chg="mod">
-          <ac:chgData name="Zamira Mektibayeva" userId="38736087-3d41-4c80-b94d-b050248fcfe1" providerId="ADAL" clId="{D8A4DCD1-0234-4A0B-85AD-7590B10512CE}" dt="2025-05-16T07:28:22.912" v="102"/>
-          <ac:spMkLst>
-            <pc:docMk/>
-            <pc:sldMk cId="3499386905" sldId="377"/>
-            <ac:spMk id="4" creationId="{5351D804-0194-C749-4C76-985CE6731430}"/>
-          </ac:spMkLst>
-        </pc:spChg>
-      </pc:sldChg>
-      <pc:sldChg chg="modSp add del mod">
-        <pc:chgData name="Zamira Mektibayeva" userId="38736087-3d41-4c80-b94d-b050248fcfe1" providerId="ADAL" clId="{D8A4DCD1-0234-4A0B-85AD-7590B10512CE}" dt="2025-05-19T05:37:48.041" v="152" actId="47"/>
-        <pc:sldMkLst>
-          <pc:docMk/>
-          <pc:sldMk cId="294066281" sldId="378"/>
-        </pc:sldMkLst>
-      </pc:sldChg>
-    </pc:docChg>
-  </pc:docChgLst>
-</pc:chgInfo>
-</file>
-
 <file path=ppt/notesMasters/notesMaster1.xml><?xml version="1.0" encoding="utf-8"?>
 <p:notesMaster xmlns:a="http://schemas.openxmlformats.org/drawingml/2006/main" xmlns:r="http://schemas.openxmlformats.org/officeDocument/2006/relationships" xmlns:p="http://schemas.openxmlformats.org/presentationml/2006/main">
   <p:cSld>
@@ -351,7 +149,7 @@
         </p:nvSpPr>
         <p:spPr>
           <a:xfrm>
-            <a:off x="0" y="4"/>
+            <a:off x="0" y="2"/>
             <a:ext cx="2945024" cy="497359"/>
           </a:xfrm>
           <a:prstGeom prst="rect">
@@ -359,7 +157,7 @@
           </a:prstGeom>
         </p:spPr>
         <p:txBody>
-          <a:bodyPr vert="horz" lIns="91266" tIns="45632" rIns="91266" bIns="45632" rtlCol="0"/>
+          <a:bodyPr vert="horz" lIns="91284" tIns="45642" rIns="91284" bIns="45642" rtlCol="0"/>
           <a:lstStyle>
             <a:lvl1pPr algn="l">
               <a:defRPr sz="1200"/>
@@ -382,7 +180,7 @@
         </p:nvSpPr>
         <p:spPr>
           <a:xfrm>
-            <a:off x="3847892" y="4"/>
+            <a:off x="3847891" y="2"/>
             <a:ext cx="2945024" cy="497359"/>
           </a:xfrm>
           <a:prstGeom prst="rect">
@@ -390,7 +188,7 @@
           </a:prstGeom>
         </p:spPr>
         <p:txBody>
-          <a:bodyPr vert="horz" lIns="91266" tIns="45632" rIns="91266" bIns="45632" rtlCol="0"/>
+          <a:bodyPr vert="horz" lIns="91284" tIns="45642" rIns="91284" bIns="45642" rtlCol="0"/>
           <a:lstStyle>
             <a:lvl1pPr algn="r">
               <a:defRPr sz="1200"/>
@@ -431,7 +229,7 @@
           </a:ln>
         </p:spPr>
         <p:txBody>
-          <a:bodyPr vert="horz" lIns="91266" tIns="45632" rIns="91266" bIns="45632" rtlCol="0" anchor="ctr"/>
+          <a:bodyPr vert="horz" lIns="91284" tIns="45642" rIns="91284" bIns="45642" rtlCol="0" anchor="ctr"/>
           <a:lstStyle/>
           <a:p>
             <a:endParaRPr lang="en-US"/>
@@ -450,7 +248,7 @@
         </p:nvSpPr>
         <p:spPr>
           <a:xfrm>
-            <a:off x="679136" y="4767680"/>
+            <a:off x="679134" y="4767679"/>
             <a:ext cx="5436235" cy="3899676"/>
           </a:xfrm>
           <a:prstGeom prst="rect">
@@ -458,7 +256,7 @@
           </a:prstGeom>
         </p:spPr>
         <p:txBody>
-          <a:bodyPr vert="horz" lIns="91266" tIns="45632" rIns="91266" bIns="45632" rtlCol="0"/>
+          <a:bodyPr vert="horz" lIns="91284" tIns="45642" rIns="91284" bIns="45642" rtlCol="0"/>
           <a:lstStyle/>
           <a:p>
             <a:pPr lvl="0"/>
@@ -509,7 +307,7 @@
         </p:nvSpPr>
         <p:spPr>
           <a:xfrm>
-            <a:off x="0" y="9408644"/>
+            <a:off x="0" y="9408642"/>
             <a:ext cx="2945024" cy="497359"/>
           </a:xfrm>
           <a:prstGeom prst="rect">
@@ -517,7 +315,7 @@
           </a:prstGeom>
         </p:spPr>
         <p:txBody>
-          <a:bodyPr vert="horz" lIns="91266" tIns="45632" rIns="91266" bIns="45632" rtlCol="0" anchor="b"/>
+          <a:bodyPr vert="horz" lIns="91284" tIns="45642" rIns="91284" bIns="45642" rtlCol="0" anchor="b"/>
           <a:lstStyle>
             <a:lvl1pPr algn="l">
               <a:defRPr sz="1200"/>
@@ -540,7 +338,7 @@
         </p:nvSpPr>
         <p:spPr>
           <a:xfrm>
-            <a:off x="3847892" y="9408644"/>
+            <a:off x="3847891" y="9408642"/>
             <a:ext cx="2945024" cy="497359"/>
           </a:xfrm>
           <a:prstGeom prst="rect">
@@ -548,7 +346,7 @@
           </a:prstGeom>
         </p:spPr>
         <p:txBody>
-          <a:bodyPr vert="horz" lIns="91266" tIns="45632" rIns="91266" bIns="45632" rtlCol="0" anchor="b"/>
+          <a:bodyPr vert="horz" lIns="91284" tIns="45642" rIns="91284" bIns="45642" rtlCol="0" anchor="b"/>
           <a:lstStyle>
             <a:lvl1pPr algn="r">
               <a:defRPr sz="1200"/>
@@ -3513,7 +3311,7 @@
         </p:nvSpPr>
         <p:spPr bwMode="auto">
           <a:xfrm>
-            <a:off x="-104197" y="7537816"/>
+            <a:off x="-108493" y="7714190"/>
             <a:ext cx="5572125" cy="1271588"/>
           </a:xfrm>
           <a:prstGeom prst="rect">
@@ -3564,22 +3362,18 @@
               </a:spcAft>
             </a:pPr>
             <a:r>
-              <a:rPr lang="en-US" altLang="en-US" sz="8000" b="1" dirty="0">
+              <a:rPr lang="ru-RU" altLang="en-US" sz="8000" b="1">
                 <a:solidFill>
                   <a:srgbClr val="2E2E38"/>
                 </a:solidFill>
                 <a:latin typeface="EYInterstate" panose="02000503020000020004" pitchFamily="2" charset="0"/>
               </a:rPr>
-              <a:t>{{ name }}</a:t>
-            </a:r>
-            <a:endParaRPr lang="ru-RU" altLang="en-US" sz="8800" b="1" i="0" strike="noStrike" cap="none" normalizeH="0" baseline="0" dirty="0">
-              <a:ln>
-                <a:noFill/>
-              </a:ln>
+              <a:t>ИМЯ</a:t>
+            </a:r>
+            <a:endParaRPr lang="ru-RU" altLang="en-US" sz="8000" b="1" dirty="0">
               <a:solidFill>
                 <a:srgbClr val="2E2E38"/>
               </a:solidFill>
-              <a:effectLst/>
               <a:latin typeface="EYInterstate" panose="02000503020000020004" pitchFamily="2" charset="0"/>
             </a:endParaRPr>
           </a:p>
@@ -3588,9 +3382,7 @@
       <p:cxnSp>
         <p:nvCxnSpPr>
           <p:cNvPr id="6" name="Straight Connector 5"/>
-          <p:cNvCxnSpPr>
-            <a:cxnSpLocks/>
-          </p:cNvCxnSpPr>
+          <p:cNvCxnSpPr/>
           <p:nvPr/>
         </p:nvCxnSpPr>
         <p:spPr>
@@ -3646,8 +3438,8 @@
         </p:blipFill>
         <p:spPr>
           <a:xfrm>
-            <a:off x="5463632" y="7265710"/>
-            <a:ext cx="1200637" cy="1406166"/>
+            <a:off x="5463632" y="7336057"/>
+            <a:ext cx="1200637" cy="1265471"/>
           </a:xfrm>
           <a:prstGeom prst="rect">
             <a:avLst/>
@@ -3657,9 +3449,7 @@
       <p:cxnSp>
         <p:nvCxnSpPr>
           <p:cNvPr id="15" name="Straight Connector 14"/>
-          <p:cNvCxnSpPr>
-            <a:cxnSpLocks/>
-          </p:cNvCxnSpPr>
+          <p:cNvCxnSpPr/>
           <p:nvPr/>
         </p:nvCxnSpPr>
         <p:spPr>
@@ -3805,7 +3595,7 @@
           <a:lstStyle/>
           <a:p>
             <a:r>
-              <a:rPr lang="ru-RU" sz="2000" b="1">
+              <a:rPr lang="ru-RU" sz="2000" b="1" dirty="0">
                 <a:solidFill>
                   <a:srgbClr val="2E2E38"/>
                 </a:solidFill>
@@ -3813,7 +3603,7 @@
               </a:rPr>
               <a:t>Следите за нашими новостями:</a:t>
             </a:r>
-            <a:endParaRPr lang="en-US" sz="2000" b="1">
+            <a:endParaRPr lang="en-US" sz="2000" b="1" dirty="0">
               <a:solidFill>
                 <a:srgbClr val="2E2E38"/>
               </a:solidFill>
@@ -3824,19 +3614,13 @@
       </p:sp>
       <p:sp>
         <p:nvSpPr>
-          <p:cNvPr id="5" name="TextBox 17">
-            <a:extLst>
-              <a:ext uri="{FF2B5EF4-FFF2-40B4-BE49-F238E27FC236}">
-                <a16:creationId xmlns:a16="http://schemas.microsoft.com/office/drawing/2014/main" id="{A069509C-9772-7FF7-3C02-92DF2FDC8017}"/>
-              </a:ext>
-            </a:extLst>
-          </p:cNvPr>
+          <p:cNvPr id="18" name="TextBox 17"/>
           <p:cNvSpPr txBox="1"/>
           <p:nvPr/>
         </p:nvSpPr>
         <p:spPr>
           <a:xfrm rot="10800000">
-            <a:off x="1073433" y="4725600"/>
+            <a:off x="1069137" y="4722168"/>
             <a:ext cx="1608432" cy="230832"/>
           </a:xfrm>
           <a:prstGeom prst="rect">
@@ -3848,101 +3632,7 @@
           <a:bodyPr wrap="square" rtlCol="0">
             <a:spAutoFit/>
           </a:bodyPr>
-          <a:lstStyle>
-            <a:defPPr>
-              <a:defRPr lang="en-US"/>
-            </a:defPPr>
-            <a:lvl1pPr marL="0" algn="l" defTabSz="914400" rtl="0" eaLnBrk="1" latinLnBrk="0" hangingPunct="1">
-              <a:defRPr sz="1800" kern="1200">
-                <a:solidFill>
-                  <a:schemeClr val="tx1"/>
-                </a:solidFill>
-                <a:latin typeface="+mn-lt"/>
-                <a:ea typeface="+mn-ea"/>
-                <a:cs typeface="+mn-cs"/>
-              </a:defRPr>
-            </a:lvl1pPr>
-            <a:lvl2pPr marL="457200" algn="l" defTabSz="914400" rtl="0" eaLnBrk="1" latinLnBrk="0" hangingPunct="1">
-              <a:defRPr sz="1800" kern="1200">
-                <a:solidFill>
-                  <a:schemeClr val="tx1"/>
-                </a:solidFill>
-                <a:latin typeface="+mn-lt"/>
-                <a:ea typeface="+mn-ea"/>
-                <a:cs typeface="+mn-cs"/>
-              </a:defRPr>
-            </a:lvl2pPr>
-            <a:lvl3pPr marL="914400" algn="l" defTabSz="914400" rtl="0" eaLnBrk="1" latinLnBrk="0" hangingPunct="1">
-              <a:defRPr sz="1800" kern="1200">
-                <a:solidFill>
-                  <a:schemeClr val="tx1"/>
-                </a:solidFill>
-                <a:latin typeface="+mn-lt"/>
-                <a:ea typeface="+mn-ea"/>
-                <a:cs typeface="+mn-cs"/>
-              </a:defRPr>
-            </a:lvl3pPr>
-            <a:lvl4pPr marL="1371600" algn="l" defTabSz="914400" rtl="0" eaLnBrk="1" latinLnBrk="0" hangingPunct="1">
-              <a:defRPr sz="1800" kern="1200">
-                <a:solidFill>
-                  <a:schemeClr val="tx1"/>
-                </a:solidFill>
-                <a:latin typeface="+mn-lt"/>
-                <a:ea typeface="+mn-ea"/>
-                <a:cs typeface="+mn-cs"/>
-              </a:defRPr>
-            </a:lvl4pPr>
-            <a:lvl5pPr marL="1828800" algn="l" defTabSz="914400" rtl="0" eaLnBrk="1" latinLnBrk="0" hangingPunct="1">
-              <a:defRPr sz="1800" kern="1200">
-                <a:solidFill>
-                  <a:schemeClr val="tx1"/>
-                </a:solidFill>
-                <a:latin typeface="+mn-lt"/>
-                <a:ea typeface="+mn-ea"/>
-                <a:cs typeface="+mn-cs"/>
-              </a:defRPr>
-            </a:lvl5pPr>
-            <a:lvl6pPr marL="2286000" algn="l" defTabSz="914400" rtl="0" eaLnBrk="1" latinLnBrk="0" hangingPunct="1">
-              <a:defRPr sz="1800" kern="1200">
-                <a:solidFill>
-                  <a:schemeClr val="tx1"/>
-                </a:solidFill>
-                <a:latin typeface="+mn-lt"/>
-                <a:ea typeface="+mn-ea"/>
-                <a:cs typeface="+mn-cs"/>
-              </a:defRPr>
-            </a:lvl6pPr>
-            <a:lvl7pPr marL="2743200" algn="l" defTabSz="914400" rtl="0" eaLnBrk="1" latinLnBrk="0" hangingPunct="1">
-              <a:defRPr sz="1800" kern="1200">
-                <a:solidFill>
-                  <a:schemeClr val="tx1"/>
-                </a:solidFill>
-                <a:latin typeface="+mn-lt"/>
-                <a:ea typeface="+mn-ea"/>
-                <a:cs typeface="+mn-cs"/>
-              </a:defRPr>
-            </a:lvl7pPr>
-            <a:lvl8pPr marL="3200400" algn="l" defTabSz="914400" rtl="0" eaLnBrk="1" latinLnBrk="0" hangingPunct="1">
-              <a:defRPr sz="1800" kern="1200">
-                <a:solidFill>
-                  <a:schemeClr val="tx1"/>
-                </a:solidFill>
-                <a:latin typeface="+mn-lt"/>
-                <a:ea typeface="+mn-ea"/>
-                <a:cs typeface="+mn-cs"/>
-              </a:defRPr>
-            </a:lvl8pPr>
-            <a:lvl9pPr marL="3657600" algn="l" defTabSz="914400" rtl="0" eaLnBrk="1" latinLnBrk="0" hangingPunct="1">
-              <a:defRPr sz="1800" kern="1200">
-                <a:solidFill>
-                  <a:schemeClr val="tx1"/>
-                </a:solidFill>
-                <a:latin typeface="+mn-lt"/>
-                <a:ea typeface="+mn-ea"/>
-                <a:cs typeface="+mn-cs"/>
-              </a:defRPr>
-            </a:lvl9pPr>
-          </a:lstStyle>
+          <a:lstStyle/>
           <a:p>
             <a:r>
               <a:rPr kumimoji="0" lang="en-US" sz="900" b="0" i="0" u="none" strike="noStrike" kern="1200" cap="none" spc="0" normalizeH="0" baseline="0" noProof="0" dirty="0">
@@ -3956,6 +3646,8 @@
                 <a:uLnTx/>
                 <a:uFillTx/>
                 <a:latin typeface="EYInterstate" panose="02000503020000020004" pitchFamily="2" charset="0"/>
+                <a:ea typeface="+mn-ea"/>
+                <a:cs typeface="+mn-cs"/>
               </a:rPr>
               <a:t>eyacademycca</a:t>
             </a:r>
@@ -3970,7 +3662,7 @@
       </p:sp>
       <p:sp>
         <p:nvSpPr>
-          <p:cNvPr id="12" name="TextBox 18">
+          <p:cNvPr id="19" name="TextBox 18">
             <a:extLst>
               <a:ext uri="{FF2B5EF4-FFF2-40B4-BE49-F238E27FC236}">
                 <a16:creationId xmlns:a16="http://schemas.microsoft.com/office/drawing/2014/main" id="{54C0E74A-E2E3-4843-A487-D261B8FE5ACE}"/>
@@ -3982,7 +3674,7 @@
         </p:nvSpPr>
         <p:spPr>
           <a:xfrm rot="10800000">
-            <a:off x="5263489" y="4724652"/>
+            <a:off x="5259193" y="4723377"/>
             <a:ext cx="1291350" cy="230832"/>
           </a:xfrm>
           <a:prstGeom prst="rect">
@@ -3994,101 +3686,7 @@
           <a:bodyPr wrap="square" rtlCol="0">
             <a:spAutoFit/>
           </a:bodyPr>
-          <a:lstStyle>
-            <a:defPPr>
-              <a:defRPr lang="en-US"/>
-            </a:defPPr>
-            <a:lvl1pPr marL="0" algn="l" defTabSz="914400" rtl="0" eaLnBrk="1" latinLnBrk="0" hangingPunct="1">
-              <a:defRPr sz="1800" kern="1200">
-                <a:solidFill>
-                  <a:schemeClr val="tx1"/>
-                </a:solidFill>
-                <a:latin typeface="+mn-lt"/>
-                <a:ea typeface="+mn-ea"/>
-                <a:cs typeface="+mn-cs"/>
-              </a:defRPr>
-            </a:lvl1pPr>
-            <a:lvl2pPr marL="457200" algn="l" defTabSz="914400" rtl="0" eaLnBrk="1" latinLnBrk="0" hangingPunct="1">
-              <a:defRPr sz="1800" kern="1200">
-                <a:solidFill>
-                  <a:schemeClr val="tx1"/>
-                </a:solidFill>
-                <a:latin typeface="+mn-lt"/>
-                <a:ea typeface="+mn-ea"/>
-                <a:cs typeface="+mn-cs"/>
-              </a:defRPr>
-            </a:lvl2pPr>
-            <a:lvl3pPr marL="914400" algn="l" defTabSz="914400" rtl="0" eaLnBrk="1" latinLnBrk="0" hangingPunct="1">
-              <a:defRPr sz="1800" kern="1200">
-                <a:solidFill>
-                  <a:schemeClr val="tx1"/>
-                </a:solidFill>
-                <a:latin typeface="+mn-lt"/>
-                <a:ea typeface="+mn-ea"/>
-                <a:cs typeface="+mn-cs"/>
-              </a:defRPr>
-            </a:lvl3pPr>
-            <a:lvl4pPr marL="1371600" algn="l" defTabSz="914400" rtl="0" eaLnBrk="1" latinLnBrk="0" hangingPunct="1">
-              <a:defRPr sz="1800" kern="1200">
-                <a:solidFill>
-                  <a:schemeClr val="tx1"/>
-                </a:solidFill>
-                <a:latin typeface="+mn-lt"/>
-                <a:ea typeface="+mn-ea"/>
-                <a:cs typeface="+mn-cs"/>
-              </a:defRPr>
-            </a:lvl4pPr>
-            <a:lvl5pPr marL="1828800" algn="l" defTabSz="914400" rtl="0" eaLnBrk="1" latinLnBrk="0" hangingPunct="1">
-              <a:defRPr sz="1800" kern="1200">
-                <a:solidFill>
-                  <a:schemeClr val="tx1"/>
-                </a:solidFill>
-                <a:latin typeface="+mn-lt"/>
-                <a:ea typeface="+mn-ea"/>
-                <a:cs typeface="+mn-cs"/>
-              </a:defRPr>
-            </a:lvl5pPr>
-            <a:lvl6pPr marL="2286000" algn="l" defTabSz="914400" rtl="0" eaLnBrk="1" latinLnBrk="0" hangingPunct="1">
-              <a:defRPr sz="1800" kern="1200">
-                <a:solidFill>
-                  <a:schemeClr val="tx1"/>
-                </a:solidFill>
-                <a:latin typeface="+mn-lt"/>
-                <a:ea typeface="+mn-ea"/>
-                <a:cs typeface="+mn-cs"/>
-              </a:defRPr>
-            </a:lvl6pPr>
-            <a:lvl7pPr marL="2743200" algn="l" defTabSz="914400" rtl="0" eaLnBrk="1" latinLnBrk="0" hangingPunct="1">
-              <a:defRPr sz="1800" kern="1200">
-                <a:solidFill>
-                  <a:schemeClr val="tx1"/>
-                </a:solidFill>
-                <a:latin typeface="+mn-lt"/>
-                <a:ea typeface="+mn-ea"/>
-                <a:cs typeface="+mn-cs"/>
-              </a:defRPr>
-            </a:lvl7pPr>
-            <a:lvl8pPr marL="3200400" algn="l" defTabSz="914400" rtl="0" eaLnBrk="1" latinLnBrk="0" hangingPunct="1">
-              <a:defRPr sz="1800" kern="1200">
-                <a:solidFill>
-                  <a:schemeClr val="tx1"/>
-                </a:solidFill>
-                <a:latin typeface="+mn-lt"/>
-                <a:ea typeface="+mn-ea"/>
-                <a:cs typeface="+mn-cs"/>
-              </a:defRPr>
-            </a:lvl8pPr>
-            <a:lvl9pPr marL="3657600" algn="l" defTabSz="914400" rtl="0" eaLnBrk="1" latinLnBrk="0" hangingPunct="1">
-              <a:defRPr sz="1800" kern="1200">
-                <a:solidFill>
-                  <a:schemeClr val="tx1"/>
-                </a:solidFill>
-                <a:latin typeface="+mn-lt"/>
-                <a:ea typeface="+mn-ea"/>
-                <a:cs typeface="+mn-cs"/>
-              </a:defRPr>
-            </a:lvl9pPr>
-          </a:lstStyle>
+          <a:lstStyle/>
           <a:p>
             <a:pPr marL="0" marR="0" lvl="0" indent="0" algn="l" defTabSz="914400" rtl="0" eaLnBrk="1" fontAlgn="auto" latinLnBrk="0" hangingPunct="1">
               <a:lnSpc>
@@ -4129,7 +3727,7 @@
       </p:sp>
       <p:pic>
         <p:nvPicPr>
-          <p:cNvPr id="13" name="Picture 12">
+          <p:cNvPr id="9" name="Picture 8">
             <a:extLst>
               <a:ext uri="{FF2B5EF4-FFF2-40B4-BE49-F238E27FC236}">
                 <a16:creationId xmlns:a16="http://schemas.microsoft.com/office/drawing/2014/main" id="{7B3828BE-A46D-4444-8FB5-EA045A1CC84E}"/>
@@ -4154,7 +3752,7 @@
         </p:blipFill>
         <p:spPr>
           <a:xfrm flipH="1" flipV="1">
-            <a:off x="1724909" y="5126170"/>
+            <a:off x="1720613" y="5124895"/>
             <a:ext cx="920842" cy="920842"/>
           </a:xfrm>
           <a:prstGeom prst="rect">
@@ -4164,7 +3762,7 @@
       </p:pic>
       <p:pic>
         <p:nvPicPr>
-          <p:cNvPr id="17" name="Picture 16">
+          <p:cNvPr id="20" name="Picture 19">
             <a:extLst>
               <a:ext uri="{FF2B5EF4-FFF2-40B4-BE49-F238E27FC236}">
                 <a16:creationId xmlns:a16="http://schemas.microsoft.com/office/drawing/2014/main" id="{380FAF62-1958-48C1-AB73-BEE53FE19788}"/>
@@ -4189,7 +3787,7 @@
         </p:blipFill>
         <p:spPr>
           <a:xfrm flipH="1" flipV="1">
-            <a:off x="2972583" y="5126170"/>
+            <a:off x="2968287" y="5124895"/>
             <a:ext cx="920840" cy="920840"/>
           </a:xfrm>
           <a:prstGeom prst="rect">
@@ -4199,7 +3797,7 @@
       </p:pic>
       <p:pic>
         <p:nvPicPr>
-          <p:cNvPr id="21" name="Picture 20">
+          <p:cNvPr id="22" name="Picture 21">
             <a:extLst>
               <a:ext uri="{FF2B5EF4-FFF2-40B4-BE49-F238E27FC236}">
                 <a16:creationId xmlns:a16="http://schemas.microsoft.com/office/drawing/2014/main" id="{3C64BE92-B82B-495E-9931-1559D223B497}"/>
@@ -4224,7 +3822,7 @@
         </p:blipFill>
         <p:spPr>
           <a:xfrm flipH="1" flipV="1">
-            <a:off x="5435275" y="5102276"/>
+            <a:off x="5430979" y="5101001"/>
             <a:ext cx="953493" cy="953493"/>
           </a:xfrm>
           <a:prstGeom prst="rect">
@@ -4234,7 +3832,7 @@
       </p:pic>
       <p:pic>
         <p:nvPicPr>
-          <p:cNvPr id="23" name="Picture 22">
+          <p:cNvPr id="8" name="Picture 7">
             <a:extLst>
               <a:ext uri="{FF2B5EF4-FFF2-40B4-BE49-F238E27FC236}">
                 <a16:creationId xmlns:a16="http://schemas.microsoft.com/office/drawing/2014/main" id="{14794DA9-1C71-4777-970D-DB939BFB215F}"/>
@@ -4259,7 +3857,7 @@
         </p:blipFill>
         <p:spPr>
           <a:xfrm rot="10800000">
-            <a:off x="443513" y="5118045"/>
+            <a:off x="439217" y="5116770"/>
             <a:ext cx="920841" cy="920841"/>
           </a:xfrm>
           <a:prstGeom prst="rect">
@@ -4269,7 +3867,7 @@
       </p:pic>
       <p:sp>
         <p:nvSpPr>
-          <p:cNvPr id="24" name="TextBox 24">
+          <p:cNvPr id="25" name="TextBox 24">
             <a:extLst>
               <a:ext uri="{FF2B5EF4-FFF2-40B4-BE49-F238E27FC236}">
                 <a16:creationId xmlns:a16="http://schemas.microsoft.com/office/drawing/2014/main" id="{A6108320-68A7-4C22-9919-75397DC87F89}"/>
@@ -4281,7 +3879,7 @@
         </p:nvSpPr>
         <p:spPr>
           <a:xfrm rot="10800000">
-            <a:off x="4076246" y="4586151"/>
+            <a:off x="4071950" y="4582719"/>
             <a:ext cx="1088634" cy="369332"/>
           </a:xfrm>
           <a:prstGeom prst="rect">
@@ -4293,101 +3891,7 @@
           <a:bodyPr wrap="square" rtlCol="0">
             <a:spAutoFit/>
           </a:bodyPr>
-          <a:lstStyle>
-            <a:defPPr>
-              <a:defRPr lang="en-US"/>
-            </a:defPPr>
-            <a:lvl1pPr marL="0" algn="l" defTabSz="914400" rtl="0" eaLnBrk="1" latinLnBrk="0" hangingPunct="1">
-              <a:defRPr sz="1800" kern="1200">
-                <a:solidFill>
-                  <a:schemeClr val="tx1"/>
-                </a:solidFill>
-                <a:latin typeface="+mn-lt"/>
-                <a:ea typeface="+mn-ea"/>
-                <a:cs typeface="+mn-cs"/>
-              </a:defRPr>
-            </a:lvl1pPr>
-            <a:lvl2pPr marL="457200" algn="l" defTabSz="914400" rtl="0" eaLnBrk="1" latinLnBrk="0" hangingPunct="1">
-              <a:defRPr sz="1800" kern="1200">
-                <a:solidFill>
-                  <a:schemeClr val="tx1"/>
-                </a:solidFill>
-                <a:latin typeface="+mn-lt"/>
-                <a:ea typeface="+mn-ea"/>
-                <a:cs typeface="+mn-cs"/>
-              </a:defRPr>
-            </a:lvl2pPr>
-            <a:lvl3pPr marL="914400" algn="l" defTabSz="914400" rtl="0" eaLnBrk="1" latinLnBrk="0" hangingPunct="1">
-              <a:defRPr sz="1800" kern="1200">
-                <a:solidFill>
-                  <a:schemeClr val="tx1"/>
-                </a:solidFill>
-                <a:latin typeface="+mn-lt"/>
-                <a:ea typeface="+mn-ea"/>
-                <a:cs typeface="+mn-cs"/>
-              </a:defRPr>
-            </a:lvl3pPr>
-            <a:lvl4pPr marL="1371600" algn="l" defTabSz="914400" rtl="0" eaLnBrk="1" latinLnBrk="0" hangingPunct="1">
-              <a:defRPr sz="1800" kern="1200">
-                <a:solidFill>
-                  <a:schemeClr val="tx1"/>
-                </a:solidFill>
-                <a:latin typeface="+mn-lt"/>
-                <a:ea typeface="+mn-ea"/>
-                <a:cs typeface="+mn-cs"/>
-              </a:defRPr>
-            </a:lvl4pPr>
-            <a:lvl5pPr marL="1828800" algn="l" defTabSz="914400" rtl="0" eaLnBrk="1" latinLnBrk="0" hangingPunct="1">
-              <a:defRPr sz="1800" kern="1200">
-                <a:solidFill>
-                  <a:schemeClr val="tx1"/>
-                </a:solidFill>
-                <a:latin typeface="+mn-lt"/>
-                <a:ea typeface="+mn-ea"/>
-                <a:cs typeface="+mn-cs"/>
-              </a:defRPr>
-            </a:lvl5pPr>
-            <a:lvl6pPr marL="2286000" algn="l" defTabSz="914400" rtl="0" eaLnBrk="1" latinLnBrk="0" hangingPunct="1">
-              <a:defRPr sz="1800" kern="1200">
-                <a:solidFill>
-                  <a:schemeClr val="tx1"/>
-                </a:solidFill>
-                <a:latin typeface="+mn-lt"/>
-                <a:ea typeface="+mn-ea"/>
-                <a:cs typeface="+mn-cs"/>
-              </a:defRPr>
-            </a:lvl6pPr>
-            <a:lvl7pPr marL="2743200" algn="l" defTabSz="914400" rtl="0" eaLnBrk="1" latinLnBrk="0" hangingPunct="1">
-              <a:defRPr sz="1800" kern="1200">
-                <a:solidFill>
-                  <a:schemeClr val="tx1"/>
-                </a:solidFill>
-                <a:latin typeface="+mn-lt"/>
-                <a:ea typeface="+mn-ea"/>
-                <a:cs typeface="+mn-cs"/>
-              </a:defRPr>
-            </a:lvl7pPr>
-            <a:lvl8pPr marL="3200400" algn="l" defTabSz="914400" rtl="0" eaLnBrk="1" latinLnBrk="0" hangingPunct="1">
-              <a:defRPr sz="1800" kern="1200">
-                <a:solidFill>
-                  <a:schemeClr val="tx1"/>
-                </a:solidFill>
-                <a:latin typeface="+mn-lt"/>
-                <a:ea typeface="+mn-ea"/>
-                <a:cs typeface="+mn-cs"/>
-              </a:defRPr>
-            </a:lvl8pPr>
-            <a:lvl9pPr marL="3657600" algn="l" defTabSz="914400" rtl="0" eaLnBrk="1" latinLnBrk="0" hangingPunct="1">
-              <a:defRPr sz="1800" kern="1200">
-                <a:solidFill>
-                  <a:schemeClr val="tx1"/>
-                </a:solidFill>
-                <a:latin typeface="+mn-lt"/>
-                <a:ea typeface="+mn-ea"/>
-                <a:cs typeface="+mn-cs"/>
-              </a:defRPr>
-            </a:lvl9pPr>
-          </a:lstStyle>
+          <a:lstStyle/>
           <a:p>
             <a:pPr marL="0" marR="0" lvl="0" indent="0" algn="l" defTabSz="914400" rtl="0" eaLnBrk="1" fontAlgn="auto" latinLnBrk="0" hangingPunct="1">
               <a:lnSpc>
@@ -4431,7 +3935,7 @@
       </p:sp>
       <p:sp>
         <p:nvSpPr>
-          <p:cNvPr id="27" name="TextBox 25">
+          <p:cNvPr id="26" name="TextBox 25">
             <a:extLst>
               <a:ext uri="{FF2B5EF4-FFF2-40B4-BE49-F238E27FC236}">
                 <a16:creationId xmlns:a16="http://schemas.microsoft.com/office/drawing/2014/main" id="{02ED9CC8-689F-44C8-89BB-F7CBEAC33A7E}"/>
@@ -4443,7 +3947,7 @@
         </p:nvSpPr>
         <p:spPr>
           <a:xfrm rot="10800000">
-            <a:off x="303161" y="4725600"/>
+            <a:off x="298865" y="4722168"/>
             <a:ext cx="1088634" cy="230832"/>
           </a:xfrm>
           <a:prstGeom prst="rect">
@@ -4455,101 +3959,7 @@
           <a:bodyPr wrap="square" rtlCol="0">
             <a:spAutoFit/>
           </a:bodyPr>
-          <a:lstStyle>
-            <a:defPPr>
-              <a:defRPr lang="en-US"/>
-            </a:defPPr>
-            <a:lvl1pPr marL="0" algn="l" defTabSz="914400" rtl="0" eaLnBrk="1" latinLnBrk="0" hangingPunct="1">
-              <a:defRPr sz="1800" kern="1200">
-                <a:solidFill>
-                  <a:schemeClr val="tx1"/>
-                </a:solidFill>
-                <a:latin typeface="+mn-lt"/>
-                <a:ea typeface="+mn-ea"/>
-                <a:cs typeface="+mn-cs"/>
-              </a:defRPr>
-            </a:lvl1pPr>
-            <a:lvl2pPr marL="457200" algn="l" defTabSz="914400" rtl="0" eaLnBrk="1" latinLnBrk="0" hangingPunct="1">
-              <a:defRPr sz="1800" kern="1200">
-                <a:solidFill>
-                  <a:schemeClr val="tx1"/>
-                </a:solidFill>
-                <a:latin typeface="+mn-lt"/>
-                <a:ea typeface="+mn-ea"/>
-                <a:cs typeface="+mn-cs"/>
-              </a:defRPr>
-            </a:lvl2pPr>
-            <a:lvl3pPr marL="914400" algn="l" defTabSz="914400" rtl="0" eaLnBrk="1" latinLnBrk="0" hangingPunct="1">
-              <a:defRPr sz="1800" kern="1200">
-                <a:solidFill>
-                  <a:schemeClr val="tx1"/>
-                </a:solidFill>
-                <a:latin typeface="+mn-lt"/>
-                <a:ea typeface="+mn-ea"/>
-                <a:cs typeface="+mn-cs"/>
-              </a:defRPr>
-            </a:lvl3pPr>
-            <a:lvl4pPr marL="1371600" algn="l" defTabSz="914400" rtl="0" eaLnBrk="1" latinLnBrk="0" hangingPunct="1">
-              <a:defRPr sz="1800" kern="1200">
-                <a:solidFill>
-                  <a:schemeClr val="tx1"/>
-                </a:solidFill>
-                <a:latin typeface="+mn-lt"/>
-                <a:ea typeface="+mn-ea"/>
-                <a:cs typeface="+mn-cs"/>
-              </a:defRPr>
-            </a:lvl4pPr>
-            <a:lvl5pPr marL="1828800" algn="l" defTabSz="914400" rtl="0" eaLnBrk="1" latinLnBrk="0" hangingPunct="1">
-              <a:defRPr sz="1800" kern="1200">
-                <a:solidFill>
-                  <a:schemeClr val="tx1"/>
-                </a:solidFill>
-                <a:latin typeface="+mn-lt"/>
-                <a:ea typeface="+mn-ea"/>
-                <a:cs typeface="+mn-cs"/>
-              </a:defRPr>
-            </a:lvl5pPr>
-            <a:lvl6pPr marL="2286000" algn="l" defTabSz="914400" rtl="0" eaLnBrk="1" latinLnBrk="0" hangingPunct="1">
-              <a:defRPr sz="1800" kern="1200">
-                <a:solidFill>
-                  <a:schemeClr val="tx1"/>
-                </a:solidFill>
-                <a:latin typeface="+mn-lt"/>
-                <a:ea typeface="+mn-ea"/>
-                <a:cs typeface="+mn-cs"/>
-              </a:defRPr>
-            </a:lvl6pPr>
-            <a:lvl7pPr marL="2743200" algn="l" defTabSz="914400" rtl="0" eaLnBrk="1" latinLnBrk="0" hangingPunct="1">
-              <a:defRPr sz="1800" kern="1200">
-                <a:solidFill>
-                  <a:schemeClr val="tx1"/>
-                </a:solidFill>
-                <a:latin typeface="+mn-lt"/>
-                <a:ea typeface="+mn-ea"/>
-                <a:cs typeface="+mn-cs"/>
-              </a:defRPr>
-            </a:lvl7pPr>
-            <a:lvl8pPr marL="3200400" algn="l" defTabSz="914400" rtl="0" eaLnBrk="1" latinLnBrk="0" hangingPunct="1">
-              <a:defRPr sz="1800" kern="1200">
-                <a:solidFill>
-                  <a:schemeClr val="tx1"/>
-                </a:solidFill>
-                <a:latin typeface="+mn-lt"/>
-                <a:ea typeface="+mn-ea"/>
-                <a:cs typeface="+mn-cs"/>
-              </a:defRPr>
-            </a:lvl8pPr>
-            <a:lvl9pPr marL="3657600" algn="l" defTabSz="914400" rtl="0" eaLnBrk="1" latinLnBrk="0" hangingPunct="1">
-              <a:defRPr sz="1800" kern="1200">
-                <a:solidFill>
-                  <a:schemeClr val="tx1"/>
-                </a:solidFill>
-                <a:latin typeface="+mn-lt"/>
-                <a:ea typeface="+mn-ea"/>
-                <a:cs typeface="+mn-cs"/>
-              </a:defRPr>
-            </a:lvl9pPr>
-          </a:lstStyle>
+          <a:lstStyle/>
           <a:p>
             <a:r>
               <a:rPr kumimoji="0" lang="en-US" sz="900" b="0" i="0" u="none" strike="noStrike" kern="1200" cap="none" spc="0" normalizeH="0" baseline="0" noProof="0" dirty="0">
@@ -4563,6 +3973,8 @@
                 <a:uLnTx/>
                 <a:uFillTx/>
                 <a:latin typeface="EYInterstate" panose="02000503020000020004" pitchFamily="2" charset="0"/>
+                <a:ea typeface="+mn-ea"/>
+                <a:cs typeface="+mn-cs"/>
               </a:rPr>
               <a:t>eyacademycca</a:t>
             </a:r>
@@ -4577,7 +3989,7 @@
       </p:sp>
       <p:pic>
         <p:nvPicPr>
-          <p:cNvPr id="28" name="Picture 27">
+          <p:cNvPr id="11" name="Picture 10">
             <a:extLst>
               <a:ext uri="{FF2B5EF4-FFF2-40B4-BE49-F238E27FC236}">
                 <a16:creationId xmlns:a16="http://schemas.microsoft.com/office/drawing/2014/main" id="{D710EACB-57CE-4A6D-B061-1F7BF76FF024}"/>
@@ -4602,7 +4014,7 @@
         </p:blipFill>
         <p:spPr>
           <a:xfrm rot="10800000">
-            <a:off x="4220255" y="5111036"/>
+            <a:off x="4215959" y="5109761"/>
             <a:ext cx="944733" cy="944733"/>
           </a:xfrm>
           <a:prstGeom prst="rect">
@@ -4612,7 +4024,7 @@
       </p:pic>
       <p:sp>
         <p:nvSpPr>
-          <p:cNvPr id="29" name="TextBox 11">
+          <p:cNvPr id="12" name="TextBox 11">
             <a:extLst>
               <a:ext uri="{FF2B5EF4-FFF2-40B4-BE49-F238E27FC236}">
                 <a16:creationId xmlns:a16="http://schemas.microsoft.com/office/drawing/2014/main" id="{3EA4188D-4344-6AEF-9846-24EAFA06F417}"/>
@@ -4624,7 +4036,7 @@
         </p:nvSpPr>
         <p:spPr>
           <a:xfrm rot="10800000">
-            <a:off x="2574206" y="4725600"/>
+            <a:off x="2569910" y="4722168"/>
             <a:ext cx="1395456" cy="230832"/>
           </a:xfrm>
           <a:prstGeom prst="rect">
@@ -4636,101 +4048,7 @@
           <a:bodyPr wrap="square" rtlCol="0">
             <a:spAutoFit/>
           </a:bodyPr>
-          <a:lstStyle>
-            <a:defPPr>
-              <a:defRPr lang="en-US"/>
-            </a:defPPr>
-            <a:lvl1pPr marL="0" algn="l" defTabSz="914400" rtl="0" eaLnBrk="1" latinLnBrk="0" hangingPunct="1">
-              <a:defRPr sz="1800" kern="1200">
-                <a:solidFill>
-                  <a:schemeClr val="tx1"/>
-                </a:solidFill>
-                <a:latin typeface="+mn-lt"/>
-                <a:ea typeface="+mn-ea"/>
-                <a:cs typeface="+mn-cs"/>
-              </a:defRPr>
-            </a:lvl1pPr>
-            <a:lvl2pPr marL="457200" algn="l" defTabSz="914400" rtl="0" eaLnBrk="1" latinLnBrk="0" hangingPunct="1">
-              <a:defRPr sz="1800" kern="1200">
-                <a:solidFill>
-                  <a:schemeClr val="tx1"/>
-                </a:solidFill>
-                <a:latin typeface="+mn-lt"/>
-                <a:ea typeface="+mn-ea"/>
-                <a:cs typeface="+mn-cs"/>
-              </a:defRPr>
-            </a:lvl2pPr>
-            <a:lvl3pPr marL="914400" algn="l" defTabSz="914400" rtl="0" eaLnBrk="1" latinLnBrk="0" hangingPunct="1">
-              <a:defRPr sz="1800" kern="1200">
-                <a:solidFill>
-                  <a:schemeClr val="tx1"/>
-                </a:solidFill>
-                <a:latin typeface="+mn-lt"/>
-                <a:ea typeface="+mn-ea"/>
-                <a:cs typeface="+mn-cs"/>
-              </a:defRPr>
-            </a:lvl3pPr>
-            <a:lvl4pPr marL="1371600" algn="l" defTabSz="914400" rtl="0" eaLnBrk="1" latinLnBrk="0" hangingPunct="1">
-              <a:defRPr sz="1800" kern="1200">
-                <a:solidFill>
-                  <a:schemeClr val="tx1"/>
-                </a:solidFill>
-                <a:latin typeface="+mn-lt"/>
-                <a:ea typeface="+mn-ea"/>
-                <a:cs typeface="+mn-cs"/>
-              </a:defRPr>
-            </a:lvl4pPr>
-            <a:lvl5pPr marL="1828800" algn="l" defTabSz="914400" rtl="0" eaLnBrk="1" latinLnBrk="0" hangingPunct="1">
-              <a:defRPr sz="1800" kern="1200">
-                <a:solidFill>
-                  <a:schemeClr val="tx1"/>
-                </a:solidFill>
-                <a:latin typeface="+mn-lt"/>
-                <a:ea typeface="+mn-ea"/>
-                <a:cs typeface="+mn-cs"/>
-              </a:defRPr>
-            </a:lvl5pPr>
-            <a:lvl6pPr marL="2286000" algn="l" defTabSz="914400" rtl="0" eaLnBrk="1" latinLnBrk="0" hangingPunct="1">
-              <a:defRPr sz="1800" kern="1200">
-                <a:solidFill>
-                  <a:schemeClr val="tx1"/>
-                </a:solidFill>
-                <a:latin typeface="+mn-lt"/>
-                <a:ea typeface="+mn-ea"/>
-                <a:cs typeface="+mn-cs"/>
-              </a:defRPr>
-            </a:lvl6pPr>
-            <a:lvl7pPr marL="2743200" algn="l" defTabSz="914400" rtl="0" eaLnBrk="1" latinLnBrk="0" hangingPunct="1">
-              <a:defRPr sz="1800" kern="1200">
-                <a:solidFill>
-                  <a:schemeClr val="tx1"/>
-                </a:solidFill>
-                <a:latin typeface="+mn-lt"/>
-                <a:ea typeface="+mn-ea"/>
-                <a:cs typeface="+mn-cs"/>
-              </a:defRPr>
-            </a:lvl7pPr>
-            <a:lvl8pPr marL="3200400" algn="l" defTabSz="914400" rtl="0" eaLnBrk="1" latinLnBrk="0" hangingPunct="1">
-              <a:defRPr sz="1800" kern="1200">
-                <a:solidFill>
-                  <a:schemeClr val="tx1"/>
-                </a:solidFill>
-                <a:latin typeface="+mn-lt"/>
-                <a:ea typeface="+mn-ea"/>
-                <a:cs typeface="+mn-cs"/>
-              </a:defRPr>
-            </a:lvl8pPr>
-            <a:lvl9pPr marL="3657600" algn="l" defTabSz="914400" rtl="0" eaLnBrk="1" latinLnBrk="0" hangingPunct="1">
-              <a:defRPr sz="1800" kern="1200">
-                <a:solidFill>
-                  <a:schemeClr val="tx1"/>
-                </a:solidFill>
-                <a:latin typeface="+mn-lt"/>
-                <a:ea typeface="+mn-ea"/>
-                <a:cs typeface="+mn-cs"/>
-              </a:defRPr>
-            </a:lvl9pPr>
-          </a:lstStyle>
+          <a:lstStyle/>
           <a:p>
             <a:r>
               <a:rPr lang="en-US" sz="900" dirty="0" err="1">
@@ -4753,7 +4071,7 @@
     </p:spTree>
     <p:extLst>
       <p:ext uri="{BB962C8B-B14F-4D97-AF65-F5344CB8AC3E}">
-        <p14:creationId xmlns:p14="http://schemas.microsoft.com/office/powerpoint/2010/main" val="2263169905"/>
+        <p14:creationId xmlns:p14="http://schemas.microsoft.com/office/powerpoint/2010/main" val="1246609571"/>
       </p:ext>
     </p:extLst>
   </p:cSld>
@@ -5286,8 +4604,19 @@
 </file>
 
 <file path=customXml/item1.xml><?xml version="1.0" encoding="utf-8"?>
-<ct:contentTypeSchema xmlns:ct="http://schemas.microsoft.com/office/2006/metadata/contentType" xmlns:ma="http://schemas.microsoft.com/office/2006/metadata/properties/metaAttributes" ct:_="" ma:_="" ma:contentTypeName="Document" ma:contentTypeID="0x01010036CB30C7FF070745AE63600DD36FD99C" ma:contentTypeVersion="18" ma:contentTypeDescription="Create a new document." ma:contentTypeScope="" ma:versionID="884e5b793fad366ac6b4df1c7cb4829d">
-  <xsd:schema xmlns:xsd="http://www.w3.org/2001/XMLSchema" xmlns:xs="http://www.w3.org/2001/XMLSchema" xmlns:p="http://schemas.microsoft.com/office/2006/metadata/properties" xmlns:ns2="31d19f59-8097-4f28-be8c-bb76aa513ec7" xmlns:ns3="092d1ec1-5dd7-44e3-bdbe-bb0324970346" targetNamespace="http://schemas.microsoft.com/office/2006/metadata/properties" ma:root="true" ma:fieldsID="77317c1c486d7e8459751d3b2f0901ab" ns2:_="" ns3:_="">
+<p:properties xmlns:p="http://schemas.microsoft.com/office/2006/metadata/properties" xmlns:xsi="http://www.w3.org/2001/XMLSchema-instance" xmlns:pc="http://schemas.microsoft.com/office/infopath/2007/PartnerControls">
+  <documentManagement>
+    <TaxCatchAll xmlns="092d1ec1-5dd7-44e3-bdbe-bb0324970346" xsi:nil="true"/>
+    <lcf76f155ced4ddcb4097134ff3c332f xmlns="31d19f59-8097-4f28-be8c-bb76aa513ec7">
+      <Terms xmlns="http://schemas.microsoft.com/office/infopath/2007/PartnerControls"/>
+    </lcf76f155ced4ddcb4097134ff3c332f>
+  </documentManagement>
+</p:properties>
+</file>
+
+<file path=customXml/item2.xml><?xml version="1.0" encoding="utf-8"?>
+<ct:contentTypeSchema xmlns:ct="http://schemas.microsoft.com/office/2006/metadata/contentType" xmlns:ma="http://schemas.microsoft.com/office/2006/metadata/properties/metaAttributes" ct:_="" ma:_="" ma:contentTypeName="Document" ma:contentTypeID="0x01010036CB30C7FF070745AE63600DD36FD99C" ma:contentTypeVersion="18" ma:contentTypeDescription="Create a new document." ma:contentTypeScope="" ma:versionID="58829916cae8d0023d0f75cd6b20e96a">
+  <xsd:schema xmlns:xsd="http://www.w3.org/2001/XMLSchema" xmlns:xs="http://www.w3.org/2001/XMLSchema" xmlns:p="http://schemas.microsoft.com/office/2006/metadata/properties" xmlns:ns2="31d19f59-8097-4f28-be8c-bb76aa513ec7" xmlns:ns3="092d1ec1-5dd7-44e3-bdbe-bb0324970346" targetNamespace="http://schemas.microsoft.com/office/2006/metadata/properties" ma:root="true" ma:fieldsID="de937be150d2e55e655ed17b73d5e1e7" ns2:_="" ns3:_="">
     <xsd:import namespace="31d19f59-8097-4f28-be8c-bb76aa513ec7"/>
     <xsd:import namespace="092d1ec1-5dd7-44e3-bdbe-bb0324970346"/>
     <xsd:element name="properties">
@@ -5534,7 +4863,7 @@
 </ct:contentTypeSchema>
 </file>
 
-<file path=customXml/item2.xml><?xml version="1.0" encoding="utf-8"?>
+<file path=customXml/item3.xml><?xml version="1.0" encoding="utf-8"?>
 <?mso-contentType ?>
 <FormTemplates xmlns="http://schemas.microsoft.com/sharepoint/v3/contenttype/forms">
   <Display>DocumentLibraryForm</Display>
@@ -5543,19 +4872,25 @@
 </FormTemplates>
 </file>
 
-<file path=customXml/item3.xml><?xml version="1.0" encoding="utf-8"?>
-<p:properties xmlns:p="http://schemas.microsoft.com/office/2006/metadata/properties" xmlns:xsi="http://www.w3.org/2001/XMLSchema-instance" xmlns:pc="http://schemas.microsoft.com/office/infopath/2007/PartnerControls">
-  <documentManagement>
-    <TaxCatchAll xmlns="092d1ec1-5dd7-44e3-bdbe-bb0324970346" xsi:nil="true"/>
-    <lcf76f155ced4ddcb4097134ff3c332f xmlns="31d19f59-8097-4f28-be8c-bb76aa513ec7">
-      <Terms xmlns="http://schemas.microsoft.com/office/infopath/2007/PartnerControls"/>
-    </lcf76f155ced4ddcb4097134ff3c332f>
-  </documentManagement>
-</p:properties>
+<file path=customXml/itemProps1.xml><?xml version="1.0" encoding="utf-8"?>
+<ds:datastoreItem xmlns:ds="http://schemas.openxmlformats.org/officeDocument/2006/customXml" ds:itemID="{13EF6247-AF62-4BA3-99F4-E62C10860DA1}">
+  <ds:schemaRefs>
+    <ds:schemaRef ds:uri="http://schemas.microsoft.com/office/2006/metadata/properties"/>
+    <ds:schemaRef ds:uri="http://schemas.microsoft.com/office/2006/documentManagement/types"/>
+    <ds:schemaRef ds:uri="http://purl.org/dc/dcmitype/"/>
+    <ds:schemaRef ds:uri="http://schemas.microsoft.com/office/infopath/2007/PartnerControls"/>
+    <ds:schemaRef ds:uri="http://purl.org/dc/terms/"/>
+    <ds:schemaRef ds:uri="http://purl.org/dc/elements/1.1/"/>
+    <ds:schemaRef ds:uri="31d19f59-8097-4f28-be8c-bb76aa513ec7"/>
+    <ds:schemaRef ds:uri="http://schemas.openxmlformats.org/package/2006/metadata/core-properties"/>
+    <ds:schemaRef ds:uri="092d1ec1-5dd7-44e3-bdbe-bb0324970346"/>
+    <ds:schemaRef ds:uri="http://www.w3.org/XML/1998/namespace"/>
+  </ds:schemaRefs>
+</ds:datastoreItem>
 </file>
 
-<file path=customXml/itemProps1.xml><?xml version="1.0" encoding="utf-8"?>
-<ds:datastoreItem xmlns:ds="http://schemas.openxmlformats.org/officeDocument/2006/customXml" ds:itemID="{CEE7EE23-E621-405E-829D-3D77F0DED481}">
+<file path=customXml/itemProps2.xml><?xml version="1.0" encoding="utf-8"?>
+<ds:datastoreItem xmlns:ds="http://schemas.openxmlformats.org/officeDocument/2006/customXml" ds:itemID="{DACC1C35-27A8-4211-A042-1F16468B2447}">
   <ds:schemaRefs>
     <ds:schemaRef ds:uri="http://schemas.microsoft.com/office/2006/metadata/contentType"/>
     <ds:schemaRef ds:uri="http://schemas.microsoft.com/office/2006/metadata/properties/metaAttributes"/>
@@ -5573,27 +4908,10 @@
 </ds:datastoreItem>
 </file>
 
-<file path=customXml/itemProps2.xml><?xml version="1.0" encoding="utf-8"?>
+<file path=customXml/itemProps3.xml><?xml version="1.0" encoding="utf-8"?>
 <ds:datastoreItem xmlns:ds="http://schemas.openxmlformats.org/officeDocument/2006/customXml" ds:itemID="{058F3194-D9BC-42FB-82E5-8AE6D6EFF922}">
   <ds:schemaRefs>
     <ds:schemaRef ds:uri="http://schemas.microsoft.com/sharepoint/v3/contenttype/forms"/>
   </ds:schemaRefs>
 </ds:datastoreItem>
-</file>
-
-<file path=customXml/itemProps3.xml><?xml version="1.0" encoding="utf-8"?>
-<ds:datastoreItem xmlns:ds="http://schemas.openxmlformats.org/officeDocument/2006/customXml" ds:itemID="{13EF6247-AF62-4BA3-99F4-E62C10860DA1}">
-  <ds:schemaRefs>
-    <ds:schemaRef ds:uri="http://schemas.microsoft.com/office/2006/metadata/properties"/>
-    <ds:schemaRef ds:uri="092d1ec1-5dd7-44e3-bdbe-bb0324970346"/>
-    <ds:schemaRef ds:uri="http://purl.org/dc/terms/"/>
-    <ds:schemaRef ds:uri="http://schemas.microsoft.com/office/2006/documentManagement/types"/>
-    <ds:schemaRef ds:uri="http://purl.org/dc/dcmitype/"/>
-    <ds:schemaRef ds:uri="http://www.w3.org/XML/1998/namespace"/>
-    <ds:schemaRef ds:uri="http://purl.org/dc/elements/1.1/"/>
-    <ds:schemaRef ds:uri="http://schemas.microsoft.com/office/infopath/2007/PartnerControls"/>
-    <ds:schemaRef ds:uri="http://schemas.openxmlformats.org/package/2006/metadata/core-properties"/>
-    <ds:schemaRef ds:uri="31d19f59-8097-4f28-be8c-bb76aa513ec7"/>
-  </ds:schemaRefs>
-</ds:datastoreItem>
 </file>
</xml_diff>